<commit_message>
Finished sorting (except Nesbitt & Meitner)
</commit_message>
<xml_diff>
--- a/Decision Tree.pptx
+++ b/Decision Tree.pptx
@@ -104,6 +104,11 @@
       </a:defRPr>
     </a:lvl9pPr>
   </p:defaultTextStyle>
+  <p:extLst>
+    <p:ext uri="{EFAFB233-063F-42B5-8137-9DF3F51BA10A}">
+      <p15:sldGuideLst xmlns:p15="http://schemas.microsoft.com/office/powerpoint/2012/main"/>
+    </p:ext>
+  </p:extLst>
 </p:presentation>
 </file>
 
@@ -3035,8 +3040,21 @@
                   <a:schemeClr val="tx1"/>
                 </a:solidFill>
               </a:rPr>
-              <a:t>N = 259</a:t>
-            </a:r>
+              <a:t>N </a:t>
+            </a:r>
+            <a:r>
+              <a:rPr lang="en-CA" sz="2008">
+                <a:solidFill>
+                  <a:schemeClr val="tx1"/>
+                </a:solidFill>
+              </a:rPr>
+              <a:t>= 258</a:t>
+            </a:r>
+            <a:endParaRPr lang="en-CA" sz="2008" dirty="0">
+              <a:solidFill>
+                <a:schemeClr val="tx1"/>
+              </a:solidFill>
+            </a:endParaRPr>
           </a:p>
         </p:txBody>
       </p:sp>

</xml_diff>